<commit_message>
Added csv file input for text format values
</commit_message>
<xml_diff>
--- a/Pe Tin te laud Isuse not finished.pptx
+++ b/Pe Tin te laud Isuse not finished.pptx
@@ -162,10 +162,9 @@
           </a:lstStyle>
           <a:p>
             <a:r>
-              <a:rPr lang="en-US" smtClean="0"/>
+              <a:rPr lang="en-US"/>
               <a:t>Click to edit Master title style</a:t>
             </a:r>
-            <a:endParaRPr lang="en-US"/>
           </a:p>
         </p:txBody>
       </p:sp>
@@ -227,10 +226,9 @@
           </a:lstStyle>
           <a:p>
             <a:r>
-              <a:rPr lang="en-US" smtClean="0"/>
+              <a:rPr lang="en-US"/>
               <a:t>Click to edit Master subtitle style</a:t>
             </a:r>
-            <a:endParaRPr lang="en-US"/>
           </a:p>
         </p:txBody>
       </p:sp>
@@ -251,7 +249,7 @@
           <a:p>
             <a:fld id="{BC1199AA-F669-470D-B072-4823E97AA7AA}" type="datetimeFigureOut">
               <a:rPr lang="en-US" smtClean="0"/>
-              <a:t>1/4/2019</a:t>
+              <a:t>7/7/2022</a:t>
             </a:fld>
             <a:endParaRPr lang="en-US"/>
           </a:p>
@@ -345,10 +343,9 @@
           <a:lstStyle/>
           <a:p>
             <a:r>
-              <a:rPr lang="en-US" smtClean="0"/>
+              <a:rPr lang="en-US"/>
               <a:t>Click to edit Master title style</a:t>
             </a:r>
-            <a:endParaRPr lang="en-US"/>
           </a:p>
         </p:txBody>
       </p:sp>
@@ -369,38 +366,37 @@
           <a:p>
             <a:pPr lvl="0"/>
             <a:r>
-              <a:rPr lang="en-US" smtClean="0"/>
+              <a:rPr lang="en-US"/>
               <a:t>Click to edit Master text styles</a:t>
             </a:r>
           </a:p>
           <a:p>
             <a:pPr lvl="1"/>
             <a:r>
-              <a:rPr lang="en-US" smtClean="0"/>
+              <a:rPr lang="en-US"/>
               <a:t>Second level</a:t>
             </a:r>
           </a:p>
           <a:p>
             <a:pPr lvl="2"/>
             <a:r>
-              <a:rPr lang="en-US" smtClean="0"/>
+              <a:rPr lang="en-US"/>
               <a:t>Third level</a:t>
             </a:r>
           </a:p>
           <a:p>
             <a:pPr lvl="3"/>
             <a:r>
-              <a:rPr lang="en-US" smtClean="0"/>
+              <a:rPr lang="en-US"/>
               <a:t>Fourth level</a:t>
             </a:r>
           </a:p>
           <a:p>
             <a:pPr lvl="4"/>
             <a:r>
-              <a:rPr lang="en-US" smtClean="0"/>
+              <a:rPr lang="en-US"/>
               <a:t>Fifth level</a:t>
             </a:r>
-            <a:endParaRPr lang="en-US"/>
           </a:p>
         </p:txBody>
       </p:sp>
@@ -421,7 +417,7 @@
           <a:p>
             <a:fld id="{BC1199AA-F669-470D-B072-4823E97AA7AA}" type="datetimeFigureOut">
               <a:rPr lang="en-US" smtClean="0"/>
-              <a:t>1/4/2019</a:t>
+              <a:t>7/7/2022</a:t>
             </a:fld>
             <a:endParaRPr lang="en-US"/>
           </a:p>
@@ -520,10 +516,9 @@
           <a:lstStyle/>
           <a:p>
             <a:r>
-              <a:rPr lang="en-US" smtClean="0"/>
+              <a:rPr lang="en-US"/>
               <a:t>Click to edit Master title style</a:t>
             </a:r>
-            <a:endParaRPr lang="en-US"/>
           </a:p>
         </p:txBody>
       </p:sp>
@@ -549,38 +544,37 @@
           <a:p>
             <a:pPr lvl="0"/>
             <a:r>
-              <a:rPr lang="en-US" smtClean="0"/>
+              <a:rPr lang="en-US"/>
               <a:t>Click to edit Master text styles</a:t>
             </a:r>
           </a:p>
           <a:p>
             <a:pPr lvl="1"/>
             <a:r>
-              <a:rPr lang="en-US" smtClean="0"/>
+              <a:rPr lang="en-US"/>
               <a:t>Second level</a:t>
             </a:r>
           </a:p>
           <a:p>
             <a:pPr lvl="2"/>
             <a:r>
-              <a:rPr lang="en-US" smtClean="0"/>
+              <a:rPr lang="en-US"/>
               <a:t>Third level</a:t>
             </a:r>
           </a:p>
           <a:p>
             <a:pPr lvl="3"/>
             <a:r>
-              <a:rPr lang="en-US" smtClean="0"/>
+              <a:rPr lang="en-US"/>
               <a:t>Fourth level</a:t>
             </a:r>
           </a:p>
           <a:p>
             <a:pPr lvl="4"/>
             <a:r>
-              <a:rPr lang="en-US" smtClean="0"/>
+              <a:rPr lang="en-US"/>
               <a:t>Fifth level</a:t>
             </a:r>
-            <a:endParaRPr lang="en-US"/>
           </a:p>
         </p:txBody>
       </p:sp>
@@ -601,7 +595,7 @@
           <a:p>
             <a:fld id="{BC1199AA-F669-470D-B072-4823E97AA7AA}" type="datetimeFigureOut">
               <a:rPr lang="en-US" smtClean="0"/>
-              <a:t>1/4/2019</a:t>
+              <a:t>7/7/2022</a:t>
             </a:fld>
             <a:endParaRPr lang="en-US"/>
           </a:p>
@@ -695,10 +689,9 @@
           <a:lstStyle/>
           <a:p>
             <a:r>
-              <a:rPr lang="en-US" smtClean="0"/>
+              <a:rPr lang="en-US"/>
               <a:t>Click to edit Master title style</a:t>
             </a:r>
-            <a:endParaRPr lang="en-US"/>
           </a:p>
         </p:txBody>
       </p:sp>
@@ -719,38 +712,37 @@
           <a:p>
             <a:pPr lvl="0"/>
             <a:r>
-              <a:rPr lang="en-US" smtClean="0"/>
+              <a:rPr lang="en-US"/>
               <a:t>Click to edit Master text styles</a:t>
             </a:r>
           </a:p>
           <a:p>
             <a:pPr lvl="1"/>
             <a:r>
-              <a:rPr lang="en-US" smtClean="0"/>
+              <a:rPr lang="en-US"/>
               <a:t>Second level</a:t>
             </a:r>
           </a:p>
           <a:p>
             <a:pPr lvl="2"/>
             <a:r>
-              <a:rPr lang="en-US" smtClean="0"/>
+              <a:rPr lang="en-US"/>
               <a:t>Third level</a:t>
             </a:r>
           </a:p>
           <a:p>
             <a:pPr lvl="3"/>
             <a:r>
-              <a:rPr lang="en-US" smtClean="0"/>
+              <a:rPr lang="en-US"/>
               <a:t>Fourth level</a:t>
             </a:r>
           </a:p>
           <a:p>
             <a:pPr lvl="4"/>
             <a:r>
-              <a:rPr lang="en-US" smtClean="0"/>
+              <a:rPr lang="en-US"/>
               <a:t>Fifth level</a:t>
             </a:r>
-            <a:endParaRPr lang="en-US"/>
           </a:p>
         </p:txBody>
       </p:sp>
@@ -771,7 +763,7 @@
           <a:p>
             <a:fld id="{BC1199AA-F669-470D-B072-4823E97AA7AA}" type="datetimeFigureOut">
               <a:rPr lang="en-US" smtClean="0"/>
-              <a:t>1/4/2019</a:t>
+              <a:t>7/7/2022</a:t>
             </a:fld>
             <a:endParaRPr lang="en-US"/>
           </a:p>
@@ -874,10 +866,9 @@
           </a:lstStyle>
           <a:p>
             <a:r>
-              <a:rPr lang="en-US" smtClean="0"/>
+              <a:rPr lang="en-US"/>
               <a:t>Click to edit Master title style</a:t>
             </a:r>
-            <a:endParaRPr lang="en-US"/>
           </a:p>
         </p:txBody>
       </p:sp>
@@ -994,7 +985,7 @@
           <a:p>
             <a:pPr lvl="0"/>
             <a:r>
-              <a:rPr lang="en-US" smtClean="0"/>
+              <a:rPr lang="en-US"/>
               <a:t>Click to edit Master text styles</a:t>
             </a:r>
           </a:p>
@@ -1017,7 +1008,7 @@
           <a:p>
             <a:fld id="{BC1199AA-F669-470D-B072-4823E97AA7AA}" type="datetimeFigureOut">
               <a:rPr lang="en-US" smtClean="0"/>
-              <a:t>1/4/2019</a:t>
+              <a:t>7/7/2022</a:t>
             </a:fld>
             <a:endParaRPr lang="en-US"/>
           </a:p>
@@ -1111,10 +1102,9 @@
           <a:lstStyle/>
           <a:p>
             <a:r>
-              <a:rPr lang="en-US" smtClean="0"/>
+              <a:rPr lang="en-US"/>
               <a:t>Click to edit Master title style</a:t>
             </a:r>
-            <a:endParaRPr lang="en-US"/>
           </a:p>
         </p:txBody>
       </p:sp>
@@ -1140,38 +1130,37 @@
           <a:p>
             <a:pPr lvl="0"/>
             <a:r>
-              <a:rPr lang="en-US" smtClean="0"/>
+              <a:rPr lang="en-US"/>
               <a:t>Click to edit Master text styles</a:t>
             </a:r>
           </a:p>
           <a:p>
             <a:pPr lvl="1"/>
             <a:r>
-              <a:rPr lang="en-US" smtClean="0"/>
+              <a:rPr lang="en-US"/>
               <a:t>Second level</a:t>
             </a:r>
           </a:p>
           <a:p>
             <a:pPr lvl="2"/>
             <a:r>
-              <a:rPr lang="en-US" smtClean="0"/>
+              <a:rPr lang="en-US"/>
               <a:t>Third level</a:t>
             </a:r>
           </a:p>
           <a:p>
             <a:pPr lvl="3"/>
             <a:r>
-              <a:rPr lang="en-US" smtClean="0"/>
+              <a:rPr lang="en-US"/>
               <a:t>Fourth level</a:t>
             </a:r>
           </a:p>
           <a:p>
             <a:pPr lvl="4"/>
             <a:r>
-              <a:rPr lang="en-US" smtClean="0"/>
+              <a:rPr lang="en-US"/>
               <a:t>Fifth level</a:t>
             </a:r>
-            <a:endParaRPr lang="en-US"/>
           </a:p>
         </p:txBody>
       </p:sp>
@@ -1197,38 +1186,37 @@
           <a:p>
             <a:pPr lvl="0"/>
             <a:r>
-              <a:rPr lang="en-US" smtClean="0"/>
+              <a:rPr lang="en-US"/>
               <a:t>Click to edit Master text styles</a:t>
             </a:r>
           </a:p>
           <a:p>
             <a:pPr lvl="1"/>
             <a:r>
-              <a:rPr lang="en-US" smtClean="0"/>
+              <a:rPr lang="en-US"/>
               <a:t>Second level</a:t>
             </a:r>
           </a:p>
           <a:p>
             <a:pPr lvl="2"/>
             <a:r>
-              <a:rPr lang="en-US" smtClean="0"/>
+              <a:rPr lang="en-US"/>
               <a:t>Third level</a:t>
             </a:r>
           </a:p>
           <a:p>
             <a:pPr lvl="3"/>
             <a:r>
-              <a:rPr lang="en-US" smtClean="0"/>
+              <a:rPr lang="en-US"/>
               <a:t>Fourth level</a:t>
             </a:r>
           </a:p>
           <a:p>
             <a:pPr lvl="4"/>
             <a:r>
-              <a:rPr lang="en-US" smtClean="0"/>
+              <a:rPr lang="en-US"/>
               <a:t>Fifth level</a:t>
             </a:r>
-            <a:endParaRPr lang="en-US"/>
           </a:p>
         </p:txBody>
       </p:sp>
@@ -1249,7 +1237,7 @@
           <a:p>
             <a:fld id="{BC1199AA-F669-470D-B072-4823E97AA7AA}" type="datetimeFigureOut">
               <a:rPr lang="en-US" smtClean="0"/>
-              <a:t>1/4/2019</a:t>
+              <a:t>7/7/2022</a:t>
             </a:fld>
             <a:endParaRPr lang="en-US"/>
           </a:p>
@@ -1348,10 +1336,9 @@
           <a:lstStyle/>
           <a:p>
             <a:r>
-              <a:rPr lang="en-US" smtClean="0"/>
+              <a:rPr lang="en-US"/>
               <a:t>Click to edit Master title style</a:t>
             </a:r>
-            <a:endParaRPr lang="en-US"/>
           </a:p>
         </p:txBody>
       </p:sp>
@@ -1414,7 +1401,7 @@
           <a:p>
             <a:pPr lvl="0"/>
             <a:r>
-              <a:rPr lang="en-US" smtClean="0"/>
+              <a:rPr lang="en-US"/>
               <a:t>Click to edit Master text styles</a:t>
             </a:r>
           </a:p>
@@ -1442,38 +1429,37 @@
           <a:p>
             <a:pPr lvl="0"/>
             <a:r>
-              <a:rPr lang="en-US" smtClean="0"/>
+              <a:rPr lang="en-US"/>
               <a:t>Click to edit Master text styles</a:t>
             </a:r>
           </a:p>
           <a:p>
             <a:pPr lvl="1"/>
             <a:r>
-              <a:rPr lang="en-US" smtClean="0"/>
+              <a:rPr lang="en-US"/>
               <a:t>Second level</a:t>
             </a:r>
           </a:p>
           <a:p>
             <a:pPr lvl="2"/>
             <a:r>
-              <a:rPr lang="en-US" smtClean="0"/>
+              <a:rPr lang="en-US"/>
               <a:t>Third level</a:t>
             </a:r>
           </a:p>
           <a:p>
             <a:pPr lvl="3"/>
             <a:r>
-              <a:rPr lang="en-US" smtClean="0"/>
+              <a:rPr lang="en-US"/>
               <a:t>Fourth level</a:t>
             </a:r>
           </a:p>
           <a:p>
             <a:pPr lvl="4"/>
             <a:r>
-              <a:rPr lang="en-US" smtClean="0"/>
+              <a:rPr lang="en-US"/>
               <a:t>Fifth level</a:t>
             </a:r>
-            <a:endParaRPr lang="en-US"/>
           </a:p>
         </p:txBody>
       </p:sp>
@@ -1536,7 +1522,7 @@
           <a:p>
             <a:pPr lvl="0"/>
             <a:r>
-              <a:rPr lang="en-US" smtClean="0"/>
+              <a:rPr lang="en-US"/>
               <a:t>Click to edit Master text styles</a:t>
             </a:r>
           </a:p>
@@ -1564,38 +1550,37 @@
           <a:p>
             <a:pPr lvl="0"/>
             <a:r>
-              <a:rPr lang="en-US" smtClean="0"/>
+              <a:rPr lang="en-US"/>
               <a:t>Click to edit Master text styles</a:t>
             </a:r>
           </a:p>
           <a:p>
             <a:pPr lvl="1"/>
             <a:r>
-              <a:rPr lang="en-US" smtClean="0"/>
+              <a:rPr lang="en-US"/>
               <a:t>Second level</a:t>
             </a:r>
           </a:p>
           <a:p>
             <a:pPr lvl="2"/>
             <a:r>
-              <a:rPr lang="en-US" smtClean="0"/>
+              <a:rPr lang="en-US"/>
               <a:t>Third level</a:t>
             </a:r>
           </a:p>
           <a:p>
             <a:pPr lvl="3"/>
             <a:r>
-              <a:rPr lang="en-US" smtClean="0"/>
+              <a:rPr lang="en-US"/>
               <a:t>Fourth level</a:t>
             </a:r>
           </a:p>
           <a:p>
             <a:pPr lvl="4"/>
             <a:r>
-              <a:rPr lang="en-US" smtClean="0"/>
+              <a:rPr lang="en-US"/>
               <a:t>Fifth level</a:t>
             </a:r>
-            <a:endParaRPr lang="en-US"/>
           </a:p>
         </p:txBody>
       </p:sp>
@@ -1616,7 +1601,7 @@
           <a:p>
             <a:fld id="{BC1199AA-F669-470D-B072-4823E97AA7AA}" type="datetimeFigureOut">
               <a:rPr lang="en-US" smtClean="0"/>
-              <a:t>1/4/2019</a:t>
+              <a:t>7/7/2022</a:t>
             </a:fld>
             <a:endParaRPr lang="en-US"/>
           </a:p>
@@ -1710,10 +1695,9 @@
           <a:lstStyle/>
           <a:p>
             <a:r>
-              <a:rPr lang="en-US" smtClean="0"/>
+              <a:rPr lang="en-US"/>
               <a:t>Click to edit Master title style</a:t>
             </a:r>
-            <a:endParaRPr lang="en-US"/>
           </a:p>
         </p:txBody>
       </p:sp>
@@ -1734,7 +1718,7 @@
           <a:p>
             <a:fld id="{BC1199AA-F669-470D-B072-4823E97AA7AA}" type="datetimeFigureOut">
               <a:rPr lang="en-US" smtClean="0"/>
-              <a:t>1/4/2019</a:t>
+              <a:t>7/7/2022</a:t>
             </a:fld>
             <a:endParaRPr lang="en-US"/>
           </a:p>
@@ -1829,7 +1813,7 @@
           <a:p>
             <a:fld id="{BC1199AA-F669-470D-B072-4823E97AA7AA}" type="datetimeFigureOut">
               <a:rPr lang="en-US" smtClean="0"/>
-              <a:t>1/4/2019</a:t>
+              <a:t>7/7/2022</a:t>
             </a:fld>
             <a:endParaRPr lang="en-US"/>
           </a:p>
@@ -1932,10 +1916,9 @@
           </a:lstStyle>
           <a:p>
             <a:r>
-              <a:rPr lang="en-US" smtClean="0"/>
+              <a:rPr lang="en-US"/>
               <a:t>Click to edit Master title style</a:t>
             </a:r>
-            <a:endParaRPr lang="en-US"/>
           </a:p>
         </p:txBody>
       </p:sp>
@@ -1989,38 +1972,37 @@
           <a:p>
             <a:pPr lvl="0"/>
             <a:r>
-              <a:rPr lang="en-US" smtClean="0"/>
+              <a:rPr lang="en-US"/>
               <a:t>Click to edit Master text styles</a:t>
             </a:r>
           </a:p>
           <a:p>
             <a:pPr lvl="1"/>
             <a:r>
-              <a:rPr lang="en-US" smtClean="0"/>
+              <a:rPr lang="en-US"/>
               <a:t>Second level</a:t>
             </a:r>
           </a:p>
           <a:p>
             <a:pPr lvl="2"/>
             <a:r>
-              <a:rPr lang="en-US" smtClean="0"/>
+              <a:rPr lang="en-US"/>
               <a:t>Third level</a:t>
             </a:r>
           </a:p>
           <a:p>
             <a:pPr lvl="3"/>
             <a:r>
-              <a:rPr lang="en-US" smtClean="0"/>
+              <a:rPr lang="en-US"/>
               <a:t>Fourth level</a:t>
             </a:r>
           </a:p>
           <a:p>
             <a:pPr lvl="4"/>
             <a:r>
-              <a:rPr lang="en-US" smtClean="0"/>
+              <a:rPr lang="en-US"/>
               <a:t>Fifth level</a:t>
             </a:r>
-            <a:endParaRPr lang="en-US"/>
           </a:p>
         </p:txBody>
       </p:sp>
@@ -2083,7 +2065,7 @@
           <a:p>
             <a:pPr lvl="0"/>
             <a:r>
-              <a:rPr lang="en-US" smtClean="0"/>
+              <a:rPr lang="en-US"/>
               <a:t>Click to edit Master text styles</a:t>
             </a:r>
           </a:p>
@@ -2106,7 +2088,7 @@
           <a:p>
             <a:fld id="{BC1199AA-F669-470D-B072-4823E97AA7AA}" type="datetimeFigureOut">
               <a:rPr lang="en-US" smtClean="0"/>
-              <a:t>1/4/2019</a:t>
+              <a:t>7/7/2022</a:t>
             </a:fld>
             <a:endParaRPr lang="en-US"/>
           </a:p>
@@ -2209,10 +2191,9 @@
           </a:lstStyle>
           <a:p>
             <a:r>
-              <a:rPr lang="en-US" smtClean="0"/>
+              <a:rPr lang="en-US"/>
               <a:t>Click to edit Master title style</a:t>
             </a:r>
-            <a:endParaRPr lang="en-US"/>
           </a:p>
         </p:txBody>
       </p:sp>
@@ -2336,7 +2317,7 @@
           <a:p>
             <a:pPr lvl="0"/>
             <a:r>
-              <a:rPr lang="en-US" smtClean="0"/>
+              <a:rPr lang="en-US"/>
               <a:t>Click to edit Master text styles</a:t>
             </a:r>
           </a:p>
@@ -2359,7 +2340,7 @@
           <a:p>
             <a:fld id="{BC1199AA-F669-470D-B072-4823E97AA7AA}" type="datetimeFigureOut">
               <a:rPr lang="en-US" smtClean="0"/>
-              <a:t>1/4/2019</a:t>
+              <a:t>7/7/2022</a:t>
             </a:fld>
             <a:endParaRPr lang="en-US"/>
           </a:p>
@@ -2468,10 +2449,9 @@
           <a:lstStyle/>
           <a:p>
             <a:r>
-              <a:rPr lang="en-US" smtClean="0"/>
+              <a:rPr lang="en-US"/>
               <a:t>Click to edit Master title style</a:t>
             </a:r>
-            <a:endParaRPr lang="en-US"/>
           </a:p>
         </p:txBody>
       </p:sp>
@@ -2502,38 +2482,37 @@
           <a:p>
             <a:pPr lvl="0"/>
             <a:r>
-              <a:rPr lang="en-US" smtClean="0"/>
+              <a:rPr lang="en-US"/>
               <a:t>Click to edit Master text styles</a:t>
             </a:r>
           </a:p>
           <a:p>
             <a:pPr lvl="1"/>
             <a:r>
-              <a:rPr lang="en-US" smtClean="0"/>
+              <a:rPr lang="en-US"/>
               <a:t>Second level</a:t>
             </a:r>
           </a:p>
           <a:p>
             <a:pPr lvl="2"/>
             <a:r>
-              <a:rPr lang="en-US" smtClean="0"/>
+              <a:rPr lang="en-US"/>
               <a:t>Third level</a:t>
             </a:r>
           </a:p>
           <a:p>
             <a:pPr lvl="3"/>
             <a:r>
-              <a:rPr lang="en-US" smtClean="0"/>
+              <a:rPr lang="en-US"/>
               <a:t>Fourth level</a:t>
             </a:r>
           </a:p>
           <a:p>
             <a:pPr lvl="4"/>
             <a:r>
-              <a:rPr lang="en-US" smtClean="0"/>
+              <a:rPr lang="en-US"/>
               <a:t>Fifth level</a:t>
             </a:r>
-            <a:endParaRPr lang="en-US"/>
           </a:p>
         </p:txBody>
       </p:sp>
@@ -2572,7 +2551,7 @@
           <a:p>
             <a:fld id="{BC1199AA-F669-470D-B072-4823E97AA7AA}" type="datetimeFigureOut">
               <a:rPr lang="en-US" smtClean="0"/>
-              <a:t>1/4/2019</a:t>
+              <a:t>7/7/2022</a:t>
             </a:fld>
             <a:endParaRPr lang="en-US"/>
           </a:p>
@@ -3058,22 +3037,16 @@
           <a:lstStyle/>
           <a:p>
             <a:r>
-              <a:rPr lang="en-US" dirty="0" err="1" smtClean="0">
+              <a:rPr lang="en-US" dirty="0" err="1">
                 <a:latin typeface="Segoe UI Semibold" panose="020B0702040204020203" pitchFamily="34" charset="0"/>
               </a:rPr>
               <a:t>Autor</a:t>
             </a:r>
             <a:r>
-              <a:rPr lang="en-US" dirty="0" smtClean="0">
-                <a:latin typeface="Segoe UI Semibold" panose="020B0702040204020203" pitchFamily="34" charset="0"/>
-              </a:rPr>
-              <a:t> </a:t>
-            </a:r>
-            <a:r>
               <a:rPr lang="en-US" dirty="0">
                 <a:latin typeface="Segoe UI Semibold" panose="020B0702040204020203" pitchFamily="34" charset="0"/>
               </a:rPr>
-              <a:t>text: </a:t>
+              <a:t> text: </a:t>
             </a:r>
             <a:r>
               <a:rPr lang="en-US" dirty="0" err="1">
@@ -3085,28 +3058,10 @@
               <a:rPr lang="en-US" dirty="0">
                 <a:latin typeface="Segoe UI Semibold" panose="020B0702040204020203" pitchFamily="34" charset="0"/>
               </a:rPr>
-              <a:t> </a:t>
-            </a:r>
-            <a:r>
-              <a:rPr lang="en-US" dirty="0" smtClean="0">
-                <a:latin typeface="Segoe UI Semibold" panose="020B0702040204020203" pitchFamily="34" charset="0"/>
-              </a:rPr>
-              <a:t>  </a:t>
-            </a:r>
-            <a:r>
-              <a:rPr lang="en-US" dirty="0">
-                <a:latin typeface="Segoe UI Semibold" panose="020B0702040204020203" pitchFamily="34" charset="0"/>
-              </a:rPr>
-              <a:t>					</a:t>
-            </a:r>
-            <a:r>
-              <a:rPr lang="en-US" dirty="0" smtClean="0">
-                <a:latin typeface="Segoe UI Semibold" panose="020B0702040204020203" pitchFamily="34" charset="0"/>
-              </a:rPr>
-              <a:t>            </a:t>
-            </a:r>
-            <a:r>
-              <a:rPr lang="en-US" dirty="0" err="1" smtClean="0">
+              <a:t>   					            </a:t>
+            </a:r>
+            <a:r>
+              <a:rPr lang="en-US" dirty="0" err="1">
                 <a:latin typeface="Segoe UI Semibold" panose="020B0702040204020203" pitchFamily="34" charset="0"/>
               </a:rPr>
               <a:t>Compozitor</a:t>
@@ -3213,13 +3168,6 @@
   <p:clrMapOvr>
     <a:masterClrMapping/>
   </p:clrMapOvr>
-  <p:timing>
-    <p:tnLst>
-      <p:par>
-        <p:cTn id="1" dur="indefinite" restart="never" nodeType="tmRoot"/>
-      </p:par>
-    </p:tnLst>
-  </p:timing>
 </p:sld>
 </file>
 
@@ -3253,7 +3201,7 @@
         <p:spPr>
           <a:xfrm>
             <a:off x="0" y="0"/>
-            <a:ext cx="12192000" cy="6858000"/>
+            <a:ext cx="5650302" cy="6858000"/>
           </a:xfrm>
         </p:spPr>
         <p:txBody>
@@ -3263,28 +3211,16 @@
           <a:lstStyle/>
           <a:p>
             <a:pPr algn="ctr"/>
-            <a:r>
-              <a:rPr lang="en-US" sz="7200" dirty="0" smtClean="0">
-                <a:latin typeface="Segoe UI Semibold" panose="020B0702040204020203" pitchFamily="34" charset="0"/>
-              </a:rPr>
-              <a:t/>
-            </a:r>
             <a:br>
-              <a:rPr lang="en-US" sz="7200" dirty="0" smtClean="0">
+              <a:rPr lang="en-US" sz="7200" dirty="0">
                 <a:latin typeface="Segoe UI Semibold" panose="020B0702040204020203" pitchFamily="34" charset="0"/>
               </a:rPr>
             </a:br>
             <a:r>
-              <a:rPr lang="en-US" sz="7200" dirty="0" smtClean="0">
-                <a:latin typeface="Segoe UI Semibold" panose="020B0702040204020203" pitchFamily="34" charset="0"/>
-              </a:rPr>
-              <a:t>1</a:t>
-            </a:r>
-            <a:r>
-              <a:rPr lang="en-US" sz="7200" dirty="0">
-                <a:latin typeface="Segoe UI Semibold" panose="020B0702040204020203" pitchFamily="34" charset="0"/>
-              </a:rPr>
-              <a:t>. </a:t>
+              <a:rPr lang="en-US" sz="7200" dirty="0">
+                <a:latin typeface="Segoe UI Semibold" panose="020B0702040204020203" pitchFamily="34" charset="0"/>
+              </a:rPr>
+              <a:t>1. </a:t>
             </a:r>
             <a:r>
               <a:rPr lang="en-US" sz="7200" dirty="0" err="1">
@@ -3501,13 +3437,6 @@
   <p:clrMapOvr>
     <a:masterClrMapping/>
   </p:clrMapOvr>
-  <p:timing>
-    <p:tnLst>
-      <p:par>
-        <p:cTn id="1" dur="indefinite" restart="never" nodeType="tmRoot"/>
-      </p:par>
-    </p:tnLst>
-  </p:timing>
 </p:sld>
 </file>
 
@@ -3550,29 +3479,16 @@
           </a:bodyPr>
           <a:lstStyle/>
           <a:p>
-            <a:pPr algn="ctr"/>
-            <a:r>
-              <a:rPr lang="en-US" sz="6600" i="1" dirty="0" smtClean="0">
-                <a:latin typeface="Segoe UI Semibold" panose="020B0702040204020203" pitchFamily="34" charset="0"/>
-              </a:rPr>
-              <a:t/>
-            </a:r>
             <a:br>
-              <a:rPr lang="en-US" sz="6600" i="1" dirty="0" smtClean="0">
+              <a:rPr lang="en-US" sz="6600" i="1" dirty="0">
                 <a:latin typeface="Segoe UI Semibold" panose="020B0702040204020203" pitchFamily="34" charset="0"/>
               </a:rPr>
             </a:br>
             <a:r>
-              <a:rPr lang="en-US" sz="6600" i="1" dirty="0" smtClean="0">
-                <a:latin typeface="Segoe UI Semibold" panose="020B0702040204020203" pitchFamily="34" charset="0"/>
-              </a:rPr>
-              <a:t>Ref </a:t>
-            </a:r>
-            <a:r>
-              <a:rPr lang="en-US" sz="6600" i="1" dirty="0">
-                <a:latin typeface="Segoe UI Semibold" panose="020B0702040204020203" pitchFamily="34" charset="0"/>
-              </a:rPr>
-              <a:t>1: /:</a:t>
+              <a:rPr lang="en-US" sz="6600" i="1" dirty="0">
+                <a:latin typeface="Segoe UI Semibold" panose="020B0702040204020203" pitchFamily="34" charset="0"/>
+              </a:rPr>
+              <a:t>Ref 1: /:</a:t>
             </a:r>
             <a:r>
               <a:rPr lang="en-US" sz="6600" i="1" dirty="0" err="1">
@@ -3597,12 +3513,6 @@
                 <a:latin typeface="Segoe UI Semibold" panose="020B0702040204020203" pitchFamily="34" charset="0"/>
               </a:rPr>
               <a:t>,</a:t>
-            </a:r>
-            <a:r>
-              <a:rPr lang="en-US" sz="6600" dirty="0">
-                <a:latin typeface="Segoe UI Semibold" panose="020B0702040204020203" pitchFamily="34" charset="0"/>
-              </a:rPr>
-              <a:t/>
             </a:r>
             <a:br>
               <a:rPr lang="en-US" sz="6600" dirty="0">
@@ -3657,12 +3567,6 @@
               </a:rPr>
               <a:t>,</a:t>
             </a:r>
-            <a:r>
-              <a:rPr lang="en-US" sz="6600" dirty="0">
-                <a:latin typeface="Segoe UI Semibold" panose="020B0702040204020203" pitchFamily="34" charset="0"/>
-              </a:rPr>
-              <a:t/>
-            </a:r>
             <a:br>
               <a:rPr lang="en-US" sz="6600" dirty="0">
                 <a:latin typeface="Segoe UI Semibold" panose="020B0702040204020203" pitchFamily="34" charset="0"/>
@@ -3704,12 +3608,6 @@
               </a:rPr>
               <a:t>,</a:t>
             </a:r>
-            <a:r>
-              <a:rPr lang="en-US" sz="6600" dirty="0">
-                <a:latin typeface="Segoe UI Semibold" panose="020B0702040204020203" pitchFamily="34" charset="0"/>
-              </a:rPr>
-              <a:t/>
-            </a:r>
             <a:br>
               <a:rPr lang="en-US" sz="6600" dirty="0">
                 <a:latin typeface="Segoe UI Semibold" panose="020B0702040204020203" pitchFamily="34" charset="0"/>
@@ -3762,12 +3660,6 @@
                 <a:latin typeface="Segoe UI Semibold" panose="020B0702040204020203" pitchFamily="34" charset="0"/>
               </a:rPr>
               <a:t>.:/</a:t>
-            </a:r>
-            <a:r>
-              <a:rPr lang="en-US" sz="6600" dirty="0">
-                <a:latin typeface="Segoe UI Semibold" panose="020B0702040204020203" pitchFamily="34" charset="0"/>
-              </a:rPr>
-              <a:t/>
             </a:r>
             <a:br>
               <a:rPr lang="en-US" sz="6600" dirty="0">
@@ -3831,13 +3723,6 @@
   <p:clrMapOvr>
     <a:masterClrMapping/>
   </p:clrMapOvr>
-  <p:timing>
-    <p:tnLst>
-      <p:par>
-        <p:cTn id="1" dur="indefinite" restart="never" nodeType="tmRoot"/>
-      </p:par>
-    </p:tnLst>
-  </p:timing>
 </p:sld>
 </file>
 
@@ -3880,7 +3765,7 @@
           </a:bodyPr>
           <a:lstStyle/>
           <a:p>
-            <a:pPr algn="ctr"/>
+            <a:pPr algn="r"/>
             <a:r>
               <a:rPr lang="en-US" sz="7200" dirty="0">
                 <a:latin typeface="Segoe UI Semibold" panose="020B0702040204020203" pitchFamily="34" charset="0"/>
@@ -4140,28 +4025,16 @@
           <a:lstStyle/>
           <a:p>
             <a:pPr algn="ctr"/>
-            <a:r>
-              <a:rPr lang="en-US" sz="6600" i="1" dirty="0" smtClean="0">
-                <a:latin typeface="Segoe UI Semibold" panose="020B0702040204020203" pitchFamily="34" charset="0"/>
-              </a:rPr>
-              <a:t/>
-            </a:r>
             <a:br>
-              <a:rPr lang="en-US" sz="6600" i="1" dirty="0" smtClean="0">
+              <a:rPr lang="en-US" sz="6600" i="1" dirty="0">
                 <a:latin typeface="Segoe UI Semibold" panose="020B0702040204020203" pitchFamily="34" charset="0"/>
               </a:rPr>
             </a:br>
             <a:r>
-              <a:rPr lang="en-US" sz="6600" i="1" dirty="0" smtClean="0">
-                <a:latin typeface="Segoe UI Semibold" panose="020B0702040204020203" pitchFamily="34" charset="0"/>
-              </a:rPr>
-              <a:t>Ref </a:t>
-            </a:r>
-            <a:r>
-              <a:rPr lang="en-US" sz="6600" i="1" dirty="0">
-                <a:latin typeface="Segoe UI Semibold" panose="020B0702040204020203" pitchFamily="34" charset="0"/>
-              </a:rPr>
-              <a:t>2: /:</a:t>
+              <a:rPr lang="en-US" sz="6600" i="1" dirty="0">
+                <a:latin typeface="Segoe UI Semibold" panose="020B0702040204020203" pitchFamily="34" charset="0"/>
+              </a:rPr>
+              <a:t>Ref 2: /:</a:t>
             </a:r>
             <a:r>
               <a:rPr lang="en-US" sz="6600" i="1" dirty="0" err="1">
@@ -4186,12 +4059,6 @@
                 <a:latin typeface="Segoe UI Semibold" panose="020B0702040204020203" pitchFamily="34" charset="0"/>
               </a:rPr>
               <a:t>,</a:t>
-            </a:r>
-            <a:r>
-              <a:rPr lang="en-US" sz="6600" dirty="0">
-                <a:latin typeface="Segoe UI Semibold" panose="020B0702040204020203" pitchFamily="34" charset="0"/>
-              </a:rPr>
-              <a:t/>
             </a:r>
             <a:br>
               <a:rPr lang="en-US" sz="6600" dirty="0">
@@ -4258,12 +4125,6 @@
               </a:rPr>
               <a:t>,</a:t>
             </a:r>
-            <a:r>
-              <a:rPr lang="en-US" sz="6600" dirty="0">
-                <a:latin typeface="Segoe UI Semibold" panose="020B0702040204020203" pitchFamily="34" charset="0"/>
-              </a:rPr>
-              <a:t/>
-            </a:r>
             <a:br>
               <a:rPr lang="en-US" sz="6600" dirty="0">
                 <a:latin typeface="Segoe UI Semibold" panose="020B0702040204020203" pitchFamily="34" charset="0"/>
@@ -4317,12 +4178,6 @@
               </a:rPr>
               <a:t>,</a:t>
             </a:r>
-            <a:r>
-              <a:rPr lang="en-US" sz="6600" dirty="0">
-                <a:latin typeface="Segoe UI Semibold" panose="020B0702040204020203" pitchFamily="34" charset="0"/>
-              </a:rPr>
-              <a:t/>
-            </a:r>
             <a:br>
               <a:rPr lang="en-US" sz="6600" dirty="0">
                 <a:latin typeface="Segoe UI Semibold" panose="020B0702040204020203" pitchFamily="34" charset="0"/>
@@ -4375,12 +4230,6 @@
                 <a:latin typeface="Segoe UI Semibold" panose="020B0702040204020203" pitchFamily="34" charset="0"/>
               </a:rPr>
               <a:t>.:/</a:t>
-            </a:r>
-            <a:r>
-              <a:rPr lang="en-US" sz="6600" dirty="0">
-                <a:latin typeface="Segoe UI Semibold" panose="020B0702040204020203" pitchFamily="34" charset="0"/>
-              </a:rPr>
-              <a:t/>
             </a:r>
             <a:br>
               <a:rPr lang="en-US" sz="6600" dirty="0">
@@ -4434,6 +4283,42 @@
           </a:prstGeom>
         </p:spPr>
       </p:pic>
+      <p:cxnSp>
+        <p:nvCxnSpPr>
+          <p:cNvPr id="5" name="Straight Connector 4">
+            <a:extLst>
+              <a:ext uri="{FF2B5EF4-FFF2-40B4-BE49-F238E27FC236}">
+                <a16:creationId xmlns:a16="http://schemas.microsoft.com/office/drawing/2014/main" id="{65B7EEBC-8878-041B-A794-2F143B468ED4}"/>
+              </a:ext>
+            </a:extLst>
+          </p:cNvPr>
+          <p:cNvCxnSpPr/>
+          <p:nvPr/>
+        </p:nvCxnSpPr>
+        <p:spPr>
+          <a:xfrm>
+            <a:off x="241540" y="1121434"/>
+            <a:ext cx="10343071" cy="0"/>
+          </a:xfrm>
+          <a:prstGeom prst="line">
+            <a:avLst/>
+          </a:prstGeom>
+        </p:spPr>
+        <p:style>
+          <a:lnRef idx="1">
+            <a:schemeClr val="accent1"/>
+          </a:lnRef>
+          <a:fillRef idx="0">
+            <a:schemeClr val="accent1"/>
+          </a:fillRef>
+          <a:effectRef idx="0">
+            <a:schemeClr val="accent1"/>
+          </a:effectRef>
+          <a:fontRef idx="minor">
+            <a:schemeClr val="tx1"/>
+          </a:fontRef>
+        </p:style>
+      </p:cxnSp>
     </p:spTree>
     <p:extLst>
       <p:ext uri="{BB962C8B-B14F-4D97-AF65-F5344CB8AC3E}">
@@ -4444,13 +4329,6 @@
   <p:clrMapOvr>
     <a:masterClrMapping/>
   </p:clrMapOvr>
-  <p:timing>
-    <p:tnLst>
-      <p:par>
-        <p:cTn id="1" dur="indefinite" restart="never" nodeType="tmRoot"/>
-      </p:par>
-    </p:tnLst>
-  </p:timing>
 </p:sld>
 </file>
 
@@ -4494,28 +4372,16 @@
           <a:lstStyle/>
           <a:p>
             <a:pPr algn="ctr"/>
-            <a:r>
-              <a:rPr lang="en-US" sz="7200" dirty="0" smtClean="0">
-                <a:latin typeface="Segoe UI Semibold" panose="020B0702040204020203" pitchFamily="34" charset="0"/>
-              </a:rPr>
-              <a:t/>
-            </a:r>
             <a:br>
-              <a:rPr lang="en-US" sz="7200" dirty="0" smtClean="0">
+              <a:rPr lang="en-US" sz="7200" dirty="0">
                 <a:latin typeface="Segoe UI Semibold" panose="020B0702040204020203" pitchFamily="34" charset="0"/>
               </a:rPr>
             </a:br>
             <a:r>
-              <a:rPr lang="en-US" sz="7200" dirty="0" smtClean="0">
-                <a:latin typeface="Segoe UI Semibold" panose="020B0702040204020203" pitchFamily="34" charset="0"/>
-              </a:rPr>
-              <a:t>3</a:t>
-            </a:r>
-            <a:r>
-              <a:rPr lang="en-US" sz="7200" dirty="0">
-                <a:latin typeface="Segoe UI Semibold" panose="020B0702040204020203" pitchFamily="34" charset="0"/>
-              </a:rPr>
-              <a:t>. </a:t>
+              <a:rPr lang="en-US" sz="7200" dirty="0">
+                <a:latin typeface="Segoe UI Semibold" panose="020B0702040204020203" pitchFamily="34" charset="0"/>
+              </a:rPr>
+              <a:t>3. </a:t>
             </a:r>
             <a:r>
               <a:rPr lang="en-US" sz="7200" dirty="0" err="1">
@@ -4793,28 +4659,16 @@
           <a:lstStyle/>
           <a:p>
             <a:pPr algn="ctr"/>
-            <a:r>
-              <a:rPr lang="en-US" sz="6600" i="1" dirty="0" smtClean="0">
-                <a:latin typeface="Segoe UI Semibold" panose="020B0702040204020203" pitchFamily="34" charset="0"/>
-              </a:rPr>
-              <a:t/>
-            </a:r>
             <a:br>
-              <a:rPr lang="en-US" sz="6600" i="1" dirty="0" smtClean="0">
+              <a:rPr lang="en-US" sz="6600" i="1" dirty="0">
                 <a:latin typeface="Segoe UI Semibold" panose="020B0702040204020203" pitchFamily="34" charset="0"/>
               </a:rPr>
             </a:br>
             <a:r>
-              <a:rPr lang="en-US" sz="6600" i="1" dirty="0" smtClean="0">
-                <a:latin typeface="Segoe UI Semibold" panose="020B0702040204020203" pitchFamily="34" charset="0"/>
-              </a:rPr>
-              <a:t>Ref </a:t>
-            </a:r>
-            <a:r>
-              <a:rPr lang="en-US" sz="6600" i="1" dirty="0">
-                <a:latin typeface="Segoe UI Semibold" panose="020B0702040204020203" pitchFamily="34" charset="0"/>
-              </a:rPr>
-              <a:t>3: /:</a:t>
+              <a:rPr lang="en-US" sz="6600" i="1" dirty="0">
+                <a:latin typeface="Segoe UI Semibold" panose="020B0702040204020203" pitchFamily="34" charset="0"/>
+              </a:rPr>
+              <a:t>Ref 3: /:</a:t>
             </a:r>
             <a:r>
               <a:rPr lang="en-US" sz="6600" i="1" dirty="0" err="1">
@@ -4863,12 +4717,6 @@
                 <a:latin typeface="Segoe UI Semibold" panose="020B0702040204020203" pitchFamily="34" charset="0"/>
               </a:rPr>
               <a:t>,</a:t>
-            </a:r>
-            <a:r>
-              <a:rPr lang="en-US" sz="6600" dirty="0">
-                <a:latin typeface="Segoe UI Semibold" panose="020B0702040204020203" pitchFamily="34" charset="0"/>
-              </a:rPr>
-              <a:t/>
             </a:r>
             <a:br>
               <a:rPr lang="en-US" sz="6600" dirty="0">
@@ -4911,12 +4759,6 @@
               </a:rPr>
               <a:t>,</a:t>
             </a:r>
-            <a:r>
-              <a:rPr lang="en-US" sz="6600" dirty="0">
-                <a:latin typeface="Segoe UI Semibold" panose="020B0702040204020203" pitchFamily="34" charset="0"/>
-              </a:rPr>
-              <a:t/>
-            </a:r>
             <a:br>
               <a:rPr lang="en-US" sz="6600" dirty="0">
                 <a:latin typeface="Segoe UI Semibold" panose="020B0702040204020203" pitchFamily="34" charset="0"/>
@@ -4958,12 +4800,6 @@
               </a:rPr>
               <a:t>,</a:t>
             </a:r>
-            <a:r>
-              <a:rPr lang="en-US" sz="6600" dirty="0">
-                <a:latin typeface="Segoe UI Semibold" panose="020B0702040204020203" pitchFamily="34" charset="0"/>
-              </a:rPr>
-              <a:t/>
-            </a:r>
             <a:br>
               <a:rPr lang="en-US" sz="6600" dirty="0">
                 <a:latin typeface="Segoe UI Semibold" panose="020B0702040204020203" pitchFamily="34" charset="0"/>
@@ -4982,13 +4818,13 @@
               <a:t> </a:t>
             </a:r>
             <a:r>
-              <a:rPr lang="en-US" sz="6600" i="1" dirty="0" err="1" smtClean="0">
+              <a:rPr lang="en-US" sz="6600" i="1" dirty="0" err="1">
                 <a:latin typeface="Segoe UI Semibold" panose="020B0702040204020203" pitchFamily="34" charset="0"/>
               </a:rPr>
               <a:t>vreau</a:t>
             </a:r>
             <a:r>
-              <a:rPr lang="en-US" sz="6600" i="1" dirty="0" smtClean="0">
+              <a:rPr lang="en-US" sz="6600" i="1" dirty="0">
                 <a:latin typeface="Segoe UI Semibold" panose="020B0702040204020203" pitchFamily="34" charset="0"/>
               </a:rPr>
               <a:t> ca </a:t>
@@ -5016,12 +4852,6 @@
                 <a:latin typeface="Segoe UI Semibold" panose="020B0702040204020203" pitchFamily="34" charset="0"/>
               </a:rPr>
               <a:t>.:/</a:t>
-            </a:r>
-            <a:r>
-              <a:rPr lang="en-US" sz="6600" dirty="0">
-                <a:latin typeface="Segoe UI Semibold" panose="020B0702040204020203" pitchFamily="34" charset="0"/>
-              </a:rPr>
-              <a:t/>
             </a:r>
             <a:br>
               <a:rPr lang="en-US" sz="6600" dirty="0">
@@ -5350,13 +5180,6 @@
   <p:clrMapOvr>
     <a:masterClrMapping/>
   </p:clrMapOvr>
-  <p:timing>
-    <p:tnLst>
-      <p:par>
-        <p:cTn id="1" dur="indefinite" restart="never" nodeType="tmRoot"/>
-      </p:par>
-    </p:tnLst>
-  </p:timing>
 </p:sld>
 </file>
 
@@ -5400,28 +5223,16 @@
           <a:lstStyle/>
           <a:p>
             <a:pPr algn="ctr"/>
-            <a:r>
-              <a:rPr lang="en-US" sz="6600" i="1" dirty="0" smtClean="0">
-                <a:latin typeface="Segoe UI Semibold" panose="020B0702040204020203" pitchFamily="34" charset="0"/>
-              </a:rPr>
-              <a:t/>
-            </a:r>
             <a:br>
-              <a:rPr lang="en-US" sz="6600" i="1" dirty="0" smtClean="0">
+              <a:rPr lang="en-US" sz="6600" i="1" dirty="0">
                 <a:latin typeface="Segoe UI Semibold" panose="020B0702040204020203" pitchFamily="34" charset="0"/>
               </a:rPr>
             </a:br>
             <a:r>
-              <a:rPr lang="en-US" sz="6600" i="1" dirty="0" smtClean="0">
-                <a:latin typeface="Segoe UI Semibold" panose="020B0702040204020203" pitchFamily="34" charset="0"/>
-              </a:rPr>
-              <a:t>Ref </a:t>
-            </a:r>
-            <a:r>
-              <a:rPr lang="en-US" sz="6600" i="1" dirty="0">
-                <a:latin typeface="Segoe UI Semibold" panose="020B0702040204020203" pitchFamily="34" charset="0"/>
-              </a:rPr>
-              <a:t>4: /:</a:t>
+              <a:rPr lang="en-US" sz="6600" i="1" dirty="0">
+                <a:latin typeface="Segoe UI Semibold" panose="020B0702040204020203" pitchFamily="34" charset="0"/>
+              </a:rPr>
+              <a:t>Ref 4: /:</a:t>
             </a:r>
             <a:r>
               <a:rPr lang="en-US" sz="6600" i="1" dirty="0" err="1">
@@ -5458,12 +5269,6 @@
                 <a:latin typeface="Segoe UI Semibold" panose="020B0702040204020203" pitchFamily="34" charset="0"/>
               </a:rPr>
               <a:t>,</a:t>
-            </a:r>
-            <a:r>
-              <a:rPr lang="en-US" sz="6600" dirty="0">
-                <a:latin typeface="Segoe UI Semibold" panose="020B0702040204020203" pitchFamily="34" charset="0"/>
-              </a:rPr>
-              <a:t/>
             </a:r>
             <a:br>
               <a:rPr lang="en-US" sz="6600" dirty="0">
@@ -5494,12 +5299,6 @@
               </a:rPr>
               <a:t>,</a:t>
             </a:r>
-            <a:r>
-              <a:rPr lang="en-US" sz="6600" dirty="0">
-                <a:latin typeface="Segoe UI Semibold" panose="020B0702040204020203" pitchFamily="34" charset="0"/>
-              </a:rPr>
-              <a:t/>
-            </a:r>
             <a:br>
               <a:rPr lang="en-US" sz="6600" dirty="0">
                 <a:latin typeface="Segoe UI Semibold" panose="020B0702040204020203" pitchFamily="34" charset="0"/>
@@ -5535,12 +5334,6 @@
               </a:rPr>
               <a:t>,</a:t>
             </a:r>
-            <a:r>
-              <a:rPr lang="en-US" sz="6600" dirty="0">
-                <a:latin typeface="Segoe UI Semibold" panose="020B0702040204020203" pitchFamily="34" charset="0"/>
-              </a:rPr>
-              <a:t/>
-            </a:r>
             <a:br>
               <a:rPr lang="en-US" sz="6600" dirty="0">
                 <a:latin typeface="Segoe UI Semibold" panose="020B0702040204020203" pitchFamily="34" charset="0"/>
@@ -5589,28 +5382,16 @@
               <a:t>preamărim</a:t>
             </a:r>
             <a:r>
-              <a:rPr lang="en-US" sz="6600" i="1" smtClean="0">
+              <a:rPr lang="en-US" sz="6600" i="1">
                 <a:latin typeface="Segoe UI Semibold" panose="020B0702040204020203" pitchFamily="34" charset="0"/>
               </a:rPr>
               <a:t>.:/</a:t>
             </a:r>
-            <a:r>
-              <a:rPr lang="en-US" sz="6600" dirty="0" smtClean="0">
-                <a:latin typeface="Segoe UI Semibold" panose="020B0702040204020203" pitchFamily="34" charset="0"/>
-              </a:rPr>
-              <a:t/>
-            </a:r>
             <a:br>
-              <a:rPr lang="en-US" sz="6600" dirty="0" smtClean="0">
+              <a:rPr lang="en-US" sz="6600" dirty="0">
                 <a:latin typeface="Segoe UI Semibold" panose="020B0702040204020203" pitchFamily="34" charset="0"/>
               </a:rPr>
             </a:br>
-            <a:r>
-              <a:rPr lang="en-US" sz="6600" dirty="0">
-                <a:latin typeface="Segoe UI Semibold" panose="020B0702040204020203" pitchFamily="34" charset="0"/>
-              </a:rPr>
-              <a:t/>
-            </a:r>
             <a:br>
               <a:rPr lang="en-US" sz="6600" dirty="0">
                 <a:latin typeface="Segoe UI Semibold" panose="020B0702040204020203" pitchFamily="34" charset="0"/>
@@ -5675,21 +5456,18 @@
           <a:lstStyle/>
           <a:p>
             <a:r>
-              <a:rPr lang="en-US" sz="2400" i="1" dirty="0" smtClean="0">
+              <a:rPr lang="en-US" sz="2400" i="1" dirty="0">
                 <a:latin typeface="Segoe UI Semibold" panose="020B0702040204020203" pitchFamily="34" charset="0"/>
                 <a:hlinkClick r:id="rId3"/>
               </a:rPr>
               <a:t>www.hccr.ro</a:t>
             </a:r>
             <a:r>
-              <a:rPr lang="en-US" sz="2400" i="1" dirty="0" smtClean="0">
+              <a:rPr lang="en-US" sz="2400" i="1" dirty="0">
                 <a:latin typeface="Segoe UI Semibold" panose="020B0702040204020203" pitchFamily="34" charset="0"/>
               </a:rPr>
               <a:t>											Amin!</a:t>
             </a:r>
-            <a:endParaRPr lang="en-US" sz="2400" i="1" dirty="0">
-              <a:latin typeface="Segoe UI Semibold" panose="020B0702040204020203" pitchFamily="34" charset="0"/>
-            </a:endParaRPr>
           </a:p>
         </p:txBody>
       </p:sp>

</xml_diff>